<commit_message>
More slides on template classes, some fixes to other ones and more examples
git-svn-id: https://svn.code.sf.net/p/cpp-lects-rus/code/trunk@226 39143b06-f351-456c-9f92-4cd32fad6823
</commit_message>
<xml_diff>
--- a/slides/sep2017/02-templfuncs.pptx
+++ b/slides/sep2017/02-templfuncs.pptx
@@ -383,7 +383,7 @@
             <a:fld id="{96DFF08F-DC6B-4601-B491-B0F83F6DD2DA}" type="datetimeFigureOut">
               <a:rPr lang="en-US" dirty="0"/>
               <a:pPr/>
-              <a:t>9/19/2017</a:t>
+              <a:t>9/20/2017</a:t>
             </a:fld>
             <a:endParaRPr lang="en-US" dirty="0"/>
           </a:p>
@@ -600,7 +600,7 @@
           <a:p>
             <a:fld id="{96DFF08F-DC6B-4601-B491-B0F83F6DD2DA}" type="datetimeFigureOut">
               <a:rPr lang="en-US" dirty="0"/>
-              <a:t>9/19/2017</a:t>
+              <a:t>9/20/2017</a:t>
             </a:fld>
             <a:endParaRPr lang="en-US" dirty="0"/>
           </a:p>
@@ -775,7 +775,7 @@
           <a:p>
             <a:fld id="{96DFF08F-DC6B-4601-B491-B0F83F6DD2DA}" type="datetimeFigureOut">
               <a:rPr lang="en-US" dirty="0"/>
-              <a:t>9/19/2017</a:t>
+              <a:t>9/20/2017</a:t>
             </a:fld>
             <a:endParaRPr lang="en-US" dirty="0"/>
           </a:p>
@@ -940,7 +940,7 @@
           <a:p>
             <a:fld id="{96DFF08F-DC6B-4601-B491-B0F83F6DD2DA}" type="datetimeFigureOut">
               <a:rPr lang="en-US" dirty="0"/>
-              <a:t>9/19/2017</a:t>
+              <a:t>9/20/2017</a:t>
             </a:fld>
             <a:endParaRPr lang="en-US" dirty="0"/>
           </a:p>
@@ -1186,7 +1186,7 @@
           <a:p>
             <a:fld id="{96DFF08F-DC6B-4601-B491-B0F83F6DD2DA}" type="datetimeFigureOut">
               <a:rPr lang="en-US" dirty="0"/>
-              <a:t>9/19/2017</a:t>
+              <a:t>9/20/2017</a:t>
             </a:fld>
             <a:endParaRPr lang="en-US" dirty="0"/>
           </a:p>
@@ -1504,7 +1504,7 @@
           <a:p>
             <a:fld id="{96DFF08F-DC6B-4601-B491-B0F83F6DD2DA}" type="datetimeFigureOut">
               <a:rPr lang="en-US" dirty="0"/>
-              <a:t>9/19/2017</a:t>
+              <a:t>9/20/2017</a:t>
             </a:fld>
             <a:endParaRPr lang="en-US" dirty="0"/>
           </a:p>
@@ -1923,7 +1923,7 @@
           <a:p>
             <a:fld id="{96DFF08F-DC6B-4601-B491-B0F83F6DD2DA}" type="datetimeFigureOut">
               <a:rPr lang="en-US" dirty="0"/>
-              <a:t>9/19/2017</a:t>
+              <a:t>9/20/2017</a:t>
             </a:fld>
             <a:endParaRPr lang="en-US" dirty="0"/>
           </a:p>
@@ -2036,7 +2036,7 @@
           <a:p>
             <a:fld id="{96DFF08F-DC6B-4601-B491-B0F83F6DD2DA}" type="datetimeFigureOut">
               <a:rPr lang="en-US" dirty="0"/>
-              <a:t>9/19/2017</a:t>
+              <a:t>9/20/2017</a:t>
             </a:fld>
             <a:endParaRPr lang="en-US" dirty="0"/>
           </a:p>
@@ -2126,7 +2126,7 @@
           <a:p>
             <a:fld id="{96DFF08F-DC6B-4601-B491-B0F83F6DD2DA}" type="datetimeFigureOut">
               <a:rPr lang="en-US" dirty="0"/>
-              <a:t>9/19/2017</a:t>
+              <a:t>9/20/2017</a:t>
             </a:fld>
             <a:endParaRPr lang="en-US" dirty="0"/>
           </a:p>
@@ -2411,7 +2411,7 @@
           <a:p>
             <a:fld id="{96DFF08F-DC6B-4601-B491-B0F83F6DD2DA}" type="datetimeFigureOut">
               <a:rPr lang="en-US" dirty="0"/>
-              <a:t>9/19/2017</a:t>
+              <a:t>9/20/2017</a:t>
             </a:fld>
             <a:endParaRPr lang="en-US" dirty="0"/>
           </a:p>
@@ -2678,7 +2678,7 @@
           <a:p>
             <a:fld id="{96DFF08F-DC6B-4601-B491-B0F83F6DD2DA}" type="datetimeFigureOut">
               <a:rPr lang="en-US" dirty="0"/>
-              <a:t>9/19/2017</a:t>
+              <a:t>9/20/2017</a:t>
             </a:fld>
             <a:endParaRPr lang="en-US" dirty="0"/>
           </a:p>
@@ -2927,7 +2927,7 @@
             <a:fld id="{96DFF08F-DC6B-4601-B491-B0F83F6DD2DA}" type="datetimeFigureOut">
               <a:rPr lang="en-US" dirty="0"/>
               <a:pPr/>
-              <a:t>9/19/2017</a:t>
+              <a:t>9/20/2017</a:t>
             </a:fld>
             <a:endParaRPr lang="en-US" dirty="0"/>
           </a:p>
@@ -6850,8 +6850,8 @@
         </p:nvSpPr>
         <p:spPr>
           <a:xfrm>
-            <a:off x="6035040" y="3154680"/>
-            <a:ext cx="4864608" cy="3203448"/>
+            <a:off x="6035039" y="3154680"/>
+            <a:ext cx="5612317" cy="3203448"/>
           </a:xfrm>
           <a:prstGeom prst="rect">
             <a:avLst/>
@@ -7114,40 +7114,49 @@
                 </a:solidFill>
                 <a:latin typeface="Consolas" panose="020B0609020204030204" pitchFamily="49" charset="0"/>
               </a:rPr>
-              <a:t>max (int x, int y) {</a:t>
-            </a:r>
-            <a:br>
+              <a:t>max&lt;int&gt; </a:t>
+            </a:r>
+            <a:r>
               <a:rPr lang="en-US" smtClean="0">
                 <a:solidFill>
                   <a:srgbClr val="0000FF"/>
                 </a:solidFill>
                 <a:latin typeface="Consolas" panose="020B0609020204030204" pitchFamily="49" charset="0"/>
               </a:rPr>
-            </a:br>
-            <a:r>
+              <a:t>(int x, int y) {</a:t>
+            </a:r>
+            <a:br>
               <a:rPr lang="en-US" smtClean="0">
                 <a:solidFill>
                   <a:srgbClr val="0000FF"/>
                 </a:solidFill>
                 <a:latin typeface="Consolas" panose="020B0609020204030204" pitchFamily="49" charset="0"/>
               </a:rPr>
-              <a:t>  return x &gt; y ? x : y;</a:t>
-            </a:r>
-            <a:br>
+            </a:br>
+            <a:r>
               <a:rPr lang="en-US" smtClean="0">
                 <a:solidFill>
                   <a:srgbClr val="0000FF"/>
                 </a:solidFill>
                 <a:latin typeface="Consolas" panose="020B0609020204030204" pitchFamily="49" charset="0"/>
               </a:rPr>
-            </a:br>
-            <a:r>
+              <a:t>  return x &gt; y ? x : y;</a:t>
+            </a:r>
+            <a:br>
               <a:rPr lang="en-US" smtClean="0">
                 <a:solidFill>
                   <a:srgbClr val="0000FF"/>
                 </a:solidFill>
                 <a:latin typeface="Consolas" panose="020B0609020204030204" pitchFamily="49" charset="0"/>
               </a:rPr>
+            </a:br>
+            <a:r>
+              <a:rPr lang="en-US" smtClean="0">
+                <a:solidFill>
+                  <a:srgbClr val="0000FF"/>
+                </a:solidFill>
+                <a:latin typeface="Consolas" panose="020B0609020204030204" pitchFamily="49" charset="0"/>
+              </a:rPr>
               <a:t>}</a:t>
             </a:r>
           </a:p>
@@ -7179,7 +7188,16 @@
                 </a:solidFill>
                 <a:latin typeface="Consolas" panose="020B0609020204030204" pitchFamily="49" charset="0"/>
               </a:rPr>
-              <a:t>max (double </a:t>
+              <a:t>max&lt;double&gt; </a:t>
+            </a:r>
+            <a:r>
+              <a:rPr lang="en-US" smtClean="0">
+                <a:solidFill>
+                  <a:srgbClr val="FF0000"/>
+                </a:solidFill>
+                <a:latin typeface="Consolas" panose="020B0609020204030204" pitchFamily="49" charset="0"/>
+              </a:rPr>
+              <a:t>(double </a:t>
             </a:r>
             <a:r>
               <a:rPr lang="en-US">
@@ -12208,19 +12226,7 @@
               <a:rPr lang="en-US" smtClean="0">
                 <a:latin typeface="Consolas" panose="020B0609020204030204" pitchFamily="49" charset="0"/>
               </a:rPr>
-              <a:t> </a:t>
-            </a:r>
-            <a:r>
-              <a:rPr lang="en-US" smtClean="0">
-                <a:latin typeface="Consolas" panose="020B0609020204030204" pitchFamily="49" charset="0"/>
-              </a:rPr>
-              <a:t> int </a:t>
-            </a:r>
-            <a:r>
-              <a:rPr lang="en-US" smtClean="0">
-                <a:latin typeface="Consolas" panose="020B0609020204030204" pitchFamily="49" charset="0"/>
-              </a:rPr>
-              <a:t>foo (int);</a:t>
+              <a:t>  int foo (int);</a:t>
             </a:r>
             <a:br>
               <a:rPr lang="en-US" smtClean="0">
@@ -18322,11 +18328,7 @@
           <a:p>
             <a:r>
               <a:rPr lang="ru-RU" smtClean="0"/>
-              <a:t>Искажение имён </a:t>
-            </a:r>
-            <a:r>
-              <a:rPr lang="ru-RU" smtClean="0"/>
-              <a:t>(идея решения)</a:t>
+              <a:t>Искажение имён (идея решения)</a:t>
             </a:r>
             <a:endParaRPr lang="en-US"/>
           </a:p>
@@ -18455,7 +18457,6 @@
               <a:rPr lang="ru-RU" smtClean="0"/>
               <a:t>Будет ли это работать?</a:t>
             </a:r>
-            <a:endParaRPr lang="ru-RU" smtClean="0"/>
           </a:p>
         </p:txBody>
       </p:sp>
@@ -18506,11 +18507,7 @@
           <a:p>
             <a:r>
               <a:rPr lang="ru-RU" smtClean="0"/>
-              <a:t>Искажение имён </a:t>
-            </a:r>
-            <a:r>
-              <a:rPr lang="ru-RU" smtClean="0"/>
-              <a:t>(идея решения)</a:t>
+              <a:t>Искажение имён (идея решения)</a:t>
             </a:r>
             <a:endParaRPr lang="en-US"/>
           </a:p>
@@ -19283,31 +19280,7 @@
                   <a:srgbClr val="0000FF"/>
                 </a:solidFill>
               </a:rPr>
-              <a:t>репроцессор делает</a:t>
-            </a:r>
-            <a:r>
-              <a:rPr lang="ru-RU" smtClean="0">
-                <a:solidFill>
-                  <a:srgbClr val="0000FF"/>
-                </a:solidFill>
-              </a:rPr>
-              <a:t> </a:t>
-            </a:r>
-            <a:r>
-              <a:rPr lang="ru-RU" smtClean="0">
-                <a:solidFill>
-                  <a:srgbClr val="0000FF"/>
-                </a:solidFill>
-              </a:rPr>
-              <a:t>один </a:t>
-            </a:r>
-            <a:r>
-              <a:rPr lang="ru-RU" smtClean="0">
-                <a:solidFill>
-                  <a:srgbClr val="0000FF"/>
-                </a:solidFill>
-              </a:rPr>
-              <a:t>проход</a:t>
+              <a:t>репроцессор делает один проход</a:t>
             </a:r>
           </a:p>
           <a:p>
@@ -19315,7 +19288,6 @@
               <a:rPr lang="ru-RU" smtClean="0"/>
               <a:t>Потренируемся</a:t>
             </a:r>
-            <a:endParaRPr lang="ru-RU" smtClean="0"/>
           </a:p>
           <a:p>
             <a:pPr marL="45720" indent="0">
@@ -19571,7 +19543,6 @@
               <a:rPr lang="ru-RU" smtClean="0"/>
               <a:t>Препроцессор делает один проход</a:t>
             </a:r>
-            <a:endParaRPr lang="ru-RU" smtClean="0"/>
           </a:p>
           <a:p>
             <a:pPr marL="731520" lvl="1" indent="-457200">
@@ -19586,11 +19557,6 @@
               </a:rPr>
               <a:t>Перед каждой подстановкой раскрываются аргументы</a:t>
             </a:r>
-            <a:endParaRPr lang="ru-RU" smtClean="0">
-              <a:solidFill>
-                <a:srgbClr val="0000FF"/>
-              </a:solidFill>
-            </a:endParaRPr>
           </a:p>
           <a:p>
             <a:r>
@@ -20028,23 +19994,7 @@
                   <a:srgbClr val="0000FF"/>
                 </a:solidFill>
               </a:rPr>
-              <a:t>М</a:t>
-            </a:r>
-            <a:r>
-              <a:rPr lang="ru-RU" smtClean="0">
-                <a:solidFill>
-                  <a:srgbClr val="0000FF"/>
-                </a:solidFill>
-              </a:rPr>
-              <a:t>акрос </a:t>
-            </a:r>
-            <a:r>
-              <a:rPr lang="ru-RU" smtClean="0">
-                <a:solidFill>
-                  <a:srgbClr val="0000FF"/>
-                </a:solidFill>
-              </a:rPr>
-              <a:t>или команда, полученные в результате раскрытия, не раскрываются</a:t>
+              <a:t>Макрос или команда, полученные в результате раскрытия, не раскрываются</a:t>
             </a:r>
           </a:p>
           <a:p>
@@ -20747,11 +20697,7 @@
           <a:p>
             <a:r>
               <a:rPr lang="ru-RU" smtClean="0"/>
-              <a:t>секретный </a:t>
-            </a:r>
-            <a:r>
-              <a:rPr lang="ru-RU" smtClean="0"/>
-              <a:t>уровень</a:t>
+              <a:t>секретный уровень</a:t>
             </a:r>
             <a:endParaRPr lang="en-US"/>
           </a:p>
@@ -21114,13 +21060,7 @@
               <a:rPr lang="en-US" smtClean="0">
                 <a:latin typeface="Consolas" panose="020B0609020204030204" pitchFamily="49" charset="0"/>
               </a:rPr>
-              <a:t>long </a:t>
-            </a:r>
-            <a:r>
-              <a:rPr lang="en-US" smtClean="0">
-                <a:latin typeface="Consolas" panose="020B0609020204030204" pitchFamily="49" charset="0"/>
-              </a:rPr>
-              <a:t>long</a:t>
+              <a:t>long long</a:t>
             </a:r>
             <a:r>
               <a:rPr lang="ru-RU">

</xml_diff>

<commit_message>
More examples and 2018 slides on template functions
git-svn-id: https://svn.code.sf.net/p/cpp-lects-rus/code/trunk@276 39143b06-f351-456c-9f92-4cd32fad6823
</commit_message>
<xml_diff>
--- a/slides/sep2017/02-templfuncs.pptx
+++ b/slides/sep2017/02-templfuncs.pptx
@@ -383,7 +383,7 @@
             <a:fld id="{96DFF08F-DC6B-4601-B491-B0F83F6DD2DA}" type="datetimeFigureOut">
               <a:rPr lang="en-US" dirty="0"/>
               <a:pPr/>
-              <a:t>9/20/2017</a:t>
+              <a:t>8/18/2018</a:t>
             </a:fld>
             <a:endParaRPr lang="en-US" dirty="0"/>
           </a:p>
@@ -600,7 +600,7 @@
           <a:p>
             <a:fld id="{96DFF08F-DC6B-4601-B491-B0F83F6DD2DA}" type="datetimeFigureOut">
               <a:rPr lang="en-US" dirty="0"/>
-              <a:t>9/20/2017</a:t>
+              <a:t>8/18/2018</a:t>
             </a:fld>
             <a:endParaRPr lang="en-US" dirty="0"/>
           </a:p>
@@ -775,7 +775,7 @@
           <a:p>
             <a:fld id="{96DFF08F-DC6B-4601-B491-B0F83F6DD2DA}" type="datetimeFigureOut">
               <a:rPr lang="en-US" dirty="0"/>
-              <a:t>9/20/2017</a:t>
+              <a:t>8/18/2018</a:t>
             </a:fld>
             <a:endParaRPr lang="en-US" dirty="0"/>
           </a:p>
@@ -940,7 +940,7 @@
           <a:p>
             <a:fld id="{96DFF08F-DC6B-4601-B491-B0F83F6DD2DA}" type="datetimeFigureOut">
               <a:rPr lang="en-US" dirty="0"/>
-              <a:t>9/20/2017</a:t>
+              <a:t>8/18/2018</a:t>
             </a:fld>
             <a:endParaRPr lang="en-US" dirty="0"/>
           </a:p>
@@ -1186,7 +1186,7 @@
           <a:p>
             <a:fld id="{96DFF08F-DC6B-4601-B491-B0F83F6DD2DA}" type="datetimeFigureOut">
               <a:rPr lang="en-US" dirty="0"/>
-              <a:t>9/20/2017</a:t>
+              <a:t>8/18/2018</a:t>
             </a:fld>
             <a:endParaRPr lang="en-US" dirty="0"/>
           </a:p>
@@ -1504,7 +1504,7 @@
           <a:p>
             <a:fld id="{96DFF08F-DC6B-4601-B491-B0F83F6DD2DA}" type="datetimeFigureOut">
               <a:rPr lang="en-US" dirty="0"/>
-              <a:t>9/20/2017</a:t>
+              <a:t>8/18/2018</a:t>
             </a:fld>
             <a:endParaRPr lang="en-US" dirty="0"/>
           </a:p>
@@ -1923,7 +1923,7 @@
           <a:p>
             <a:fld id="{96DFF08F-DC6B-4601-B491-B0F83F6DD2DA}" type="datetimeFigureOut">
               <a:rPr lang="en-US" dirty="0"/>
-              <a:t>9/20/2017</a:t>
+              <a:t>8/18/2018</a:t>
             </a:fld>
             <a:endParaRPr lang="en-US" dirty="0"/>
           </a:p>
@@ -2036,7 +2036,7 @@
           <a:p>
             <a:fld id="{96DFF08F-DC6B-4601-B491-B0F83F6DD2DA}" type="datetimeFigureOut">
               <a:rPr lang="en-US" dirty="0"/>
-              <a:t>9/20/2017</a:t>
+              <a:t>8/18/2018</a:t>
             </a:fld>
             <a:endParaRPr lang="en-US" dirty="0"/>
           </a:p>
@@ -2126,7 +2126,7 @@
           <a:p>
             <a:fld id="{96DFF08F-DC6B-4601-B491-B0F83F6DD2DA}" type="datetimeFigureOut">
               <a:rPr lang="en-US" dirty="0"/>
-              <a:t>9/20/2017</a:t>
+              <a:t>8/18/2018</a:t>
             </a:fld>
             <a:endParaRPr lang="en-US" dirty="0"/>
           </a:p>
@@ -2411,7 +2411,7 @@
           <a:p>
             <a:fld id="{96DFF08F-DC6B-4601-B491-B0F83F6DD2DA}" type="datetimeFigureOut">
               <a:rPr lang="en-US" dirty="0"/>
-              <a:t>9/20/2017</a:t>
+              <a:t>8/18/2018</a:t>
             </a:fld>
             <a:endParaRPr lang="en-US" dirty="0"/>
           </a:p>
@@ -2678,7 +2678,7 @@
           <a:p>
             <a:fld id="{96DFF08F-DC6B-4601-B491-B0F83F6DD2DA}" type="datetimeFigureOut">
               <a:rPr lang="en-US" dirty="0"/>
-              <a:t>9/20/2017</a:t>
+              <a:t>8/18/2018</a:t>
             </a:fld>
             <a:endParaRPr lang="en-US" dirty="0"/>
           </a:p>
@@ -2927,7 +2927,7 @@
             <a:fld id="{96DFF08F-DC6B-4601-B491-B0F83F6DD2DA}" type="datetimeFigureOut">
               <a:rPr lang="en-US" dirty="0"/>
               <a:pPr/>
-              <a:t>9/20/2017</a:t>
+              <a:t>8/18/2018</a:t>
             </a:fld>
             <a:endParaRPr lang="en-US" dirty="0"/>
           </a:p>
@@ -7114,49 +7114,40 @@
                 </a:solidFill>
                 <a:latin typeface="Consolas" panose="020B0609020204030204" pitchFamily="49" charset="0"/>
               </a:rPr>
-              <a:t>max&lt;int&gt; </a:t>
-            </a:r>
-            <a:r>
+              <a:t>max&lt;int&gt; (int x, int y) {</a:t>
+            </a:r>
+            <a:br>
               <a:rPr lang="en-US" smtClean="0">
                 <a:solidFill>
                   <a:srgbClr val="0000FF"/>
                 </a:solidFill>
                 <a:latin typeface="Consolas" panose="020B0609020204030204" pitchFamily="49" charset="0"/>
               </a:rPr>
-              <a:t>(int x, int y) {</a:t>
-            </a:r>
-            <a:br>
+            </a:br>
+            <a:r>
               <a:rPr lang="en-US" smtClean="0">
                 <a:solidFill>
                   <a:srgbClr val="0000FF"/>
                 </a:solidFill>
                 <a:latin typeface="Consolas" panose="020B0609020204030204" pitchFamily="49" charset="0"/>
               </a:rPr>
-            </a:br>
-            <a:r>
+              <a:t>  return x &gt; y ? x : y;</a:t>
+            </a:r>
+            <a:br>
               <a:rPr lang="en-US" smtClean="0">
                 <a:solidFill>
                   <a:srgbClr val="0000FF"/>
                 </a:solidFill>
                 <a:latin typeface="Consolas" panose="020B0609020204030204" pitchFamily="49" charset="0"/>
               </a:rPr>
-              <a:t>  return x &gt; y ? x : y;</a:t>
-            </a:r>
-            <a:br>
+            </a:br>
+            <a:r>
               <a:rPr lang="en-US" smtClean="0">
                 <a:solidFill>
                   <a:srgbClr val="0000FF"/>
                 </a:solidFill>
                 <a:latin typeface="Consolas" panose="020B0609020204030204" pitchFamily="49" charset="0"/>
               </a:rPr>
-            </a:br>
-            <a:r>
-              <a:rPr lang="en-US" smtClean="0">
-                <a:solidFill>
-                  <a:srgbClr val="0000FF"/>
-                </a:solidFill>
-                <a:latin typeface="Consolas" panose="020B0609020204030204" pitchFamily="49" charset="0"/>
-              </a:rPr>
               <a:t>}</a:t>
             </a:r>
           </a:p>
@@ -7188,16 +7179,7 @@
                 </a:solidFill>
                 <a:latin typeface="Consolas" panose="020B0609020204030204" pitchFamily="49" charset="0"/>
               </a:rPr>
-              <a:t>max&lt;double&gt; </a:t>
-            </a:r>
-            <a:r>
-              <a:rPr lang="en-US" smtClean="0">
-                <a:solidFill>
-                  <a:srgbClr val="FF0000"/>
-                </a:solidFill>
-                <a:latin typeface="Consolas" panose="020B0609020204030204" pitchFamily="49" charset="0"/>
-              </a:rPr>
-              <a:t>(double </a:t>
+              <a:t>max&lt;double&gt; (double </a:t>
             </a:r>
             <a:r>
               <a:rPr lang="en-US">

</xml_diff>